<commit_message>
update lab1,2; add lab6
1. update lab1,2.
2. add lab6 for FPGA prototyping.
</commit_message>
<xml_diff>
--- a/tutorials/lab0_虚拟机.pptx
+++ b/tutorials/lab0_虚拟机.pptx
@@ -5,7 +5,7 @@
     <p:sldMasterId id="2147484040" r:id="rId1"/>
   </p:sldMasterIdLst>
   <p:notesMasterIdLst>
-    <p:notesMasterId r:id="rId9"/>
+    <p:notesMasterId r:id="rId14"/>
   </p:notesMasterIdLst>
   <p:sldIdLst>
     <p:sldId id="2248" r:id="rId2"/>
@@ -15,6 +15,11 @@
     <p:sldId id="6918" r:id="rId6"/>
     <p:sldId id="6919" r:id="rId7"/>
     <p:sldId id="6920" r:id="rId8"/>
+    <p:sldId id="6921" r:id="rId9"/>
+    <p:sldId id="6922" r:id="rId10"/>
+    <p:sldId id="6924" r:id="rId11"/>
+    <p:sldId id="6925" r:id="rId12"/>
+    <p:sldId id="6923" r:id="rId13"/>
   </p:sldIdLst>
   <p:sldSz cx="9144000" cy="6858000" type="screen4x3"/>
   <p:notesSz cx="7102475" cy="10233025"/>
@@ -125,6 +130,11 @@
             <p14:sldId id="6918"/>
             <p14:sldId id="6919"/>
             <p14:sldId id="6920"/>
+            <p14:sldId id="6921"/>
+            <p14:sldId id="6922"/>
+            <p14:sldId id="6924"/>
+            <p14:sldId id="6925"/>
+            <p14:sldId id="6923"/>
           </p14:sldIdLst>
         </p14:section>
       </p14:sectionLst>
@@ -241,7 +251,7 @@
           <a:p>
             <a:fld id="{9ED75E01-0EF1-48C2-A225-423E6166D74A}" type="datetimeFigureOut">
               <a:rPr lang="zh-CN" altLang="en-US" smtClean="0"/>
-              <a:t>2024/9/20</a:t>
+              <a:t>2024/9/29</a:t>
             </a:fld>
             <a:endParaRPr lang="zh-CN" altLang="en-US"/>
           </a:p>
@@ -1249,7 +1259,7 @@
           <a:p>
             <a:fld id="{525738E0-514B-4B27-865A-11992516E93C}" type="datetime4">
               <a:rPr lang="en-US" altLang="zh-CN" smtClean="0"/>
-              <a:t>September 20, 2024</a:t>
+              <a:t>September 29, 2024</a:t>
             </a:fld>
             <a:endParaRPr lang="zh-CN" altLang="en-US"/>
           </a:p>
@@ -3125,7 +3135,7 @@
           <a:p>
             <a:fld id="{FB5C3CA1-B04C-4C04-8D1E-77CF30B3E24E}" type="datetime1">
               <a:rPr lang="en-US" altLang="zh-CN" smtClean="0"/>
-              <a:t>9/20/2024</a:t>
+              <a:t>9/29/2024</a:t>
             </a:fld>
             <a:endParaRPr lang="en-US"/>
           </a:p>
@@ -4410,7 +4420,7 @@
             </a:pPr>
             <a:fld id="{0E0D492D-E599-4F0D-BA78-6EEA0311D34C}" type="datetime4">
               <a:rPr lang="en-US" altLang="zh-CN" smtClean="0"/>
-              <a:t>September 20, 2024</a:t>
+              <a:t>September 29, 2024</a:t>
             </a:fld>
             <a:endParaRPr lang="en-US" altLang="zh-CN">
               <a:cs typeface="Arial" charset="0"/>
@@ -4719,7 +4729,7 @@
             </a:pPr>
             <a:fld id="{D67BBE8C-0A4B-43CE-9430-1242DFAA7339}" type="datetime4">
               <a:rPr lang="en-US" altLang="zh-CN" smtClean="0"/>
-              <a:t>September 20, 2024</a:t>
+              <a:t>September 29, 2024</a:t>
             </a:fld>
             <a:endParaRPr lang="en-US" altLang="zh-CN">
               <a:cs typeface="Arial" charset="0"/>
@@ -4860,7 +4870,7 @@
             </a:pPr>
             <a:fld id="{4E341A39-4A90-477E-8107-2FD1A1C95399}" type="datetime4">
               <a:rPr lang="en-US" altLang="zh-CN" smtClean="0"/>
-              <a:t>September 20, 2024</a:t>
+              <a:t>September 29, 2024</a:t>
             </a:fld>
             <a:endParaRPr lang="en-US" altLang="zh-CN">
               <a:cs typeface="Arial" charset="0"/>
@@ -5165,7 +5175,7 @@
             </a:pPr>
             <a:fld id="{0629EA72-D578-4F57-BEAD-86CF28FC678C}" type="datetime4">
               <a:rPr lang="en-US" altLang="zh-CN" smtClean="0"/>
-              <a:t>September 20, 2024</a:t>
+              <a:t>September 29, 2024</a:t>
             </a:fld>
             <a:endParaRPr lang="en-US" altLang="zh-CN">
               <a:cs typeface="Arial" charset="0"/>
@@ -6623,7 +6633,7 @@
             </a:pPr>
             <a:fld id="{D6C2F118-23C6-4D76-A422-251B03B97126}" type="datetime4">
               <a:rPr lang="en-US" altLang="zh-CN" smtClean="0"/>
-              <a:t>September 20, 2024</a:t>
+              <a:t>September 29, 2024</a:t>
             </a:fld>
             <a:endParaRPr lang="en-US" altLang="zh-CN">
               <a:cs typeface="Arial" charset="0"/>
@@ -7197,6 +7207,499 @@
     <a:masterClrMapping/>
   </p:clrMapOvr>
   <p:transition advTm="1587"/>
+</p:sld>
+</file>
+
+<file path=ppt/slides/slide10.xml><?xml version="1.0" encoding="utf-8"?>
+<p:sld xmlns:a="http://schemas.openxmlformats.org/drawingml/2006/main" xmlns:r="http://schemas.openxmlformats.org/officeDocument/2006/relationships" xmlns:p="http://schemas.openxmlformats.org/presentationml/2006/main">
+  <p:cSld>
+    <p:spTree>
+      <p:nvGrpSpPr>
+        <p:cNvPr id="1" name=""/>
+        <p:cNvGrpSpPr/>
+        <p:nvPr/>
+      </p:nvGrpSpPr>
+      <p:grpSpPr>
+        <a:xfrm>
+          <a:off x="0" y="0"/>
+          <a:ext cx="0" cy="0"/>
+          <a:chOff x="0" y="0"/>
+          <a:chExt cx="0" cy="0"/>
+        </a:xfrm>
+      </p:grpSpPr>
+      <p:sp>
+        <p:nvSpPr>
+          <p:cNvPr id="2" name="标题 1">
+            <a:extLst>
+              <a:ext uri="{FF2B5EF4-FFF2-40B4-BE49-F238E27FC236}">
+                <a16:creationId xmlns:a16="http://schemas.microsoft.com/office/drawing/2014/main" id="{46355071-0BD9-4A37-803B-1590A041EE36}"/>
+              </a:ext>
+            </a:extLst>
+          </p:cNvPr>
+          <p:cNvSpPr>
+            <a:spLocks noGrp="1"/>
+          </p:cNvSpPr>
+          <p:nvPr>
+            <p:ph type="title"/>
+          </p:nvPr>
+        </p:nvSpPr>
+        <p:spPr/>
+        <p:txBody>
+          <a:bodyPr/>
+          <a:lstStyle/>
+          <a:p>
+            <a:r>
+              <a:rPr lang="zh-CN" altLang="en-US" dirty="0"/>
+              <a:t>安装</a:t>
+            </a:r>
+            <a:r>
+              <a:rPr lang="en-US" altLang="zh-CN" dirty="0" err="1"/>
+              <a:t>cocotb</a:t>
+            </a:r>
+            <a:r>
+              <a:rPr lang="zh-CN" altLang="en-US" dirty="0"/>
+              <a:t>扩展库</a:t>
+            </a:r>
+          </a:p>
+        </p:txBody>
+      </p:sp>
+      <p:sp>
+        <p:nvSpPr>
+          <p:cNvPr id="3" name="内容占位符 2">
+            <a:extLst>
+              <a:ext uri="{FF2B5EF4-FFF2-40B4-BE49-F238E27FC236}">
+                <a16:creationId xmlns:a16="http://schemas.microsoft.com/office/drawing/2014/main" id="{5EDB9C6E-3653-4B25-AF37-BA36A134AE5E}"/>
+              </a:ext>
+            </a:extLst>
+          </p:cNvPr>
+          <p:cNvSpPr>
+            <a:spLocks noGrp="1"/>
+          </p:cNvSpPr>
+          <p:nvPr>
+            <p:ph idx="1"/>
+          </p:nvPr>
+        </p:nvSpPr>
+        <p:spPr/>
+        <p:txBody>
+          <a:bodyPr/>
+          <a:lstStyle/>
+          <a:p>
+            <a:r>
+              <a:rPr lang="en-US" altLang="zh-CN" dirty="0"/>
+              <a:t>pip3 install </a:t>
+            </a:r>
+            <a:r>
+              <a:rPr lang="en-US" altLang="zh-CN" dirty="0" err="1"/>
+              <a:t>cocotb_test</a:t>
+            </a:r>
+            <a:endParaRPr lang="en-US" altLang="zh-CN" dirty="0"/>
+          </a:p>
+          <a:p>
+            <a:r>
+              <a:rPr lang="en-US" altLang="zh-CN" dirty="0"/>
+              <a:t>pip3 install </a:t>
+            </a:r>
+            <a:r>
+              <a:rPr lang="en-US" altLang="zh-CN" dirty="0" err="1"/>
+              <a:t>cocotbext-axi</a:t>
+            </a:r>
+            <a:endParaRPr lang="en-US" altLang="zh-CN" dirty="0"/>
+          </a:p>
+          <a:p>
+            <a:endParaRPr lang="zh-CN" altLang="en-US" dirty="0"/>
+          </a:p>
+        </p:txBody>
+      </p:sp>
+      <p:sp>
+        <p:nvSpPr>
+          <p:cNvPr id="4" name="灯片编号占位符 3">
+            <a:extLst>
+              <a:ext uri="{FF2B5EF4-FFF2-40B4-BE49-F238E27FC236}">
+                <a16:creationId xmlns:a16="http://schemas.microsoft.com/office/drawing/2014/main" id="{72541D6D-A586-45A7-94E3-7CAB18DF1F2A}"/>
+              </a:ext>
+            </a:extLst>
+          </p:cNvPr>
+          <p:cNvSpPr>
+            <a:spLocks noGrp="1"/>
+          </p:cNvSpPr>
+          <p:nvPr>
+            <p:ph type="sldNum" sz="quarter" idx="11"/>
+          </p:nvPr>
+        </p:nvSpPr>
+        <p:spPr/>
+        <p:txBody>
+          <a:bodyPr/>
+          <a:lstStyle/>
+          <a:p>
+            <a:fld id="{0C913308-F349-4B6D-A68A-DD1791B4A57B}" type="slidenum">
+              <a:rPr lang="zh-CN" altLang="en-US" smtClean="0"/>
+              <a:t>10</a:t>
+            </a:fld>
+            <a:endParaRPr lang="zh-CN" altLang="en-US"/>
+          </a:p>
+        </p:txBody>
+      </p:sp>
+    </p:spTree>
+    <p:extLst>
+      <p:ext uri="{BB962C8B-B14F-4D97-AF65-F5344CB8AC3E}">
+        <p14:creationId xmlns:p14="http://schemas.microsoft.com/office/powerpoint/2010/main" val="2518524031"/>
+      </p:ext>
+    </p:extLst>
+  </p:cSld>
+  <p:clrMapOvr>
+    <a:masterClrMapping/>
+  </p:clrMapOvr>
+  <p:transition/>
+</p:sld>
+</file>
+
+<file path=ppt/slides/slide11.xml><?xml version="1.0" encoding="utf-8"?>
+<p:sld xmlns:a="http://schemas.openxmlformats.org/drawingml/2006/main" xmlns:r="http://schemas.openxmlformats.org/officeDocument/2006/relationships" xmlns:p="http://schemas.openxmlformats.org/presentationml/2006/main">
+  <p:cSld>
+    <p:spTree>
+      <p:nvGrpSpPr>
+        <p:cNvPr id="1" name=""/>
+        <p:cNvGrpSpPr/>
+        <p:nvPr/>
+      </p:nvGrpSpPr>
+      <p:grpSpPr>
+        <a:xfrm>
+          <a:off x="0" y="0"/>
+          <a:ext cx="0" cy="0"/>
+          <a:chOff x="0" y="0"/>
+          <a:chExt cx="0" cy="0"/>
+        </a:xfrm>
+      </p:grpSpPr>
+      <p:sp>
+        <p:nvSpPr>
+          <p:cNvPr id="2" name="标题 1">
+            <a:extLst>
+              <a:ext uri="{FF2B5EF4-FFF2-40B4-BE49-F238E27FC236}">
+                <a16:creationId xmlns:a16="http://schemas.microsoft.com/office/drawing/2014/main" id="{29958694-D35C-4BEB-BB60-D97E06DCA3B7}"/>
+              </a:ext>
+            </a:extLst>
+          </p:cNvPr>
+          <p:cNvSpPr>
+            <a:spLocks noGrp="1"/>
+          </p:cNvSpPr>
+          <p:nvPr>
+            <p:ph type="title"/>
+          </p:nvPr>
+        </p:nvSpPr>
+        <p:spPr/>
+        <p:txBody>
+          <a:bodyPr/>
+          <a:lstStyle/>
+          <a:p>
+            <a:r>
+              <a:rPr lang="zh-CN" altLang="en-US" dirty="0"/>
+              <a:t>设置</a:t>
+            </a:r>
+            <a:r>
+              <a:rPr lang="en-US" altLang="zh-CN" dirty="0" err="1"/>
+              <a:t>verilator</a:t>
+            </a:r>
+            <a:r>
+              <a:rPr lang="zh-CN" altLang="en-US" dirty="0"/>
+              <a:t>程序的执行权限</a:t>
+            </a:r>
+          </a:p>
+        </p:txBody>
+      </p:sp>
+      <p:sp>
+        <p:nvSpPr>
+          <p:cNvPr id="3" name="内容占位符 2">
+            <a:extLst>
+              <a:ext uri="{FF2B5EF4-FFF2-40B4-BE49-F238E27FC236}">
+                <a16:creationId xmlns:a16="http://schemas.microsoft.com/office/drawing/2014/main" id="{CBE0EF2B-75D4-4837-86BD-25F718C80C83}"/>
+              </a:ext>
+            </a:extLst>
+          </p:cNvPr>
+          <p:cNvSpPr>
+            <a:spLocks noGrp="1"/>
+          </p:cNvSpPr>
+          <p:nvPr>
+            <p:ph idx="1"/>
+          </p:nvPr>
+        </p:nvSpPr>
+        <p:spPr/>
+        <p:txBody>
+          <a:bodyPr/>
+          <a:lstStyle/>
+          <a:p>
+            <a:r>
+              <a:rPr lang="zh-CN" altLang="en-US" dirty="0"/>
+              <a:t>将</a:t>
+            </a:r>
+            <a:r>
+              <a:rPr lang="en-US" altLang="zh-CN" dirty="0"/>
+              <a:t>/home/</a:t>
+            </a:r>
+            <a:r>
+              <a:rPr lang="en-US" altLang="zh-CN" dirty="0" err="1"/>
+              <a:t>asic</a:t>
+            </a:r>
+            <a:r>
+              <a:rPr lang="en-US" altLang="zh-CN" dirty="0"/>
+              <a:t>/tools/</a:t>
+            </a:r>
+            <a:r>
+              <a:rPr lang="en-US" altLang="zh-CN" dirty="0" err="1"/>
+              <a:t>verilator</a:t>
+            </a:r>
+            <a:r>
+              <a:rPr lang="en-US" altLang="zh-CN" dirty="0"/>
+              <a:t>/bin</a:t>
+            </a:r>
+            <a:r>
+              <a:rPr lang="zh-CN" altLang="en-US" dirty="0"/>
+              <a:t>目录下的文件权限设置成可执行</a:t>
+            </a:r>
+            <a:endParaRPr lang="en-US" altLang="zh-CN" dirty="0"/>
+          </a:p>
+          <a:p>
+            <a:pPr lvl="1"/>
+            <a:r>
+              <a:rPr lang="en-US" altLang="zh-CN" dirty="0"/>
+              <a:t>cd</a:t>
+            </a:r>
+            <a:r>
+              <a:rPr lang="zh-CN" altLang="en-US" dirty="0"/>
+              <a:t> </a:t>
+            </a:r>
+            <a:r>
+              <a:rPr lang="en-US" altLang="zh-CN" dirty="0"/>
+              <a:t>~/tools/</a:t>
+            </a:r>
+            <a:r>
+              <a:rPr lang="en-US" altLang="zh-CN" dirty="0" err="1"/>
+              <a:t>verilator</a:t>
+            </a:r>
+            <a:r>
+              <a:rPr lang="en-US" altLang="zh-CN" dirty="0"/>
+              <a:t>/bin</a:t>
+            </a:r>
+          </a:p>
+          <a:p>
+            <a:pPr lvl="1"/>
+            <a:r>
+              <a:rPr lang="en-US" altLang="zh-CN" dirty="0" err="1"/>
+              <a:t>chmod</a:t>
+            </a:r>
+            <a:r>
+              <a:rPr lang="en-US" altLang="zh-CN" dirty="0"/>
+              <a:t> +x *</a:t>
+            </a:r>
+          </a:p>
+          <a:p>
+            <a:pPr lvl="1"/>
+            <a:r>
+              <a:rPr lang="en-US" altLang="zh-CN" dirty="0" err="1"/>
+              <a:t>ll</a:t>
+            </a:r>
+            <a:endParaRPr lang="zh-CN" altLang="en-US" dirty="0"/>
+          </a:p>
+        </p:txBody>
+      </p:sp>
+      <p:sp>
+        <p:nvSpPr>
+          <p:cNvPr id="4" name="灯片编号占位符 3">
+            <a:extLst>
+              <a:ext uri="{FF2B5EF4-FFF2-40B4-BE49-F238E27FC236}">
+                <a16:creationId xmlns:a16="http://schemas.microsoft.com/office/drawing/2014/main" id="{7D0FA076-0EC4-4046-992D-B195A1B0EB84}"/>
+              </a:ext>
+            </a:extLst>
+          </p:cNvPr>
+          <p:cNvSpPr>
+            <a:spLocks noGrp="1"/>
+          </p:cNvSpPr>
+          <p:nvPr>
+            <p:ph type="sldNum" sz="quarter" idx="11"/>
+          </p:nvPr>
+        </p:nvSpPr>
+        <p:spPr/>
+        <p:txBody>
+          <a:bodyPr/>
+          <a:lstStyle/>
+          <a:p>
+            <a:fld id="{0C913308-F349-4B6D-A68A-DD1791B4A57B}" type="slidenum">
+              <a:rPr lang="zh-CN" altLang="en-US" smtClean="0"/>
+              <a:t>11</a:t>
+            </a:fld>
+            <a:endParaRPr lang="zh-CN" altLang="en-US"/>
+          </a:p>
+        </p:txBody>
+      </p:sp>
+      <p:pic>
+        <p:nvPicPr>
+          <p:cNvPr id="6" name="图片 5">
+            <a:extLst>
+              <a:ext uri="{FF2B5EF4-FFF2-40B4-BE49-F238E27FC236}">
+                <a16:creationId xmlns:a16="http://schemas.microsoft.com/office/drawing/2014/main" id="{EA10DA44-736C-4687-A0BD-D044231AD993}"/>
+              </a:ext>
+            </a:extLst>
+          </p:cNvPr>
+          <p:cNvPicPr>
+            <a:picLocks noChangeAspect="1"/>
+          </p:cNvPicPr>
+          <p:nvPr/>
+        </p:nvPicPr>
+        <p:blipFill>
+          <a:blip r:embed="rId2"/>
+          <a:stretch>
+            <a:fillRect/>
+          </a:stretch>
+        </p:blipFill>
+        <p:spPr>
+          <a:xfrm>
+            <a:off x="1115616" y="2708920"/>
+            <a:ext cx="7107049" cy="2826256"/>
+          </a:xfrm>
+          <a:prstGeom prst="rect">
+            <a:avLst/>
+          </a:prstGeom>
+        </p:spPr>
+      </p:pic>
+    </p:spTree>
+    <p:extLst>
+      <p:ext uri="{BB962C8B-B14F-4D97-AF65-F5344CB8AC3E}">
+        <p14:creationId xmlns:p14="http://schemas.microsoft.com/office/powerpoint/2010/main" val="2651697877"/>
+      </p:ext>
+    </p:extLst>
+  </p:cSld>
+  <p:clrMapOvr>
+    <a:masterClrMapping/>
+  </p:clrMapOvr>
+  <p:transition/>
+</p:sld>
+</file>
+
+<file path=ppt/slides/slide12.xml><?xml version="1.0" encoding="utf-8"?>
+<p:sld xmlns:a="http://schemas.openxmlformats.org/drawingml/2006/main" xmlns:r="http://schemas.openxmlformats.org/officeDocument/2006/relationships" xmlns:p="http://schemas.openxmlformats.org/presentationml/2006/main">
+  <p:cSld>
+    <p:spTree>
+      <p:nvGrpSpPr>
+        <p:cNvPr id="1" name=""/>
+        <p:cNvGrpSpPr/>
+        <p:nvPr/>
+      </p:nvGrpSpPr>
+      <p:grpSpPr>
+        <a:xfrm>
+          <a:off x="0" y="0"/>
+          <a:ext cx="0" cy="0"/>
+          <a:chOff x="0" y="0"/>
+          <a:chExt cx="0" cy="0"/>
+        </a:xfrm>
+      </p:grpSpPr>
+      <p:sp>
+        <p:nvSpPr>
+          <p:cNvPr id="2" name="标题 1">
+            <a:extLst>
+              <a:ext uri="{FF2B5EF4-FFF2-40B4-BE49-F238E27FC236}">
+                <a16:creationId xmlns:a16="http://schemas.microsoft.com/office/drawing/2014/main" id="{EF8A6ED3-7D1B-4BB5-ADDC-B6AC9A847E77}"/>
+              </a:ext>
+            </a:extLst>
+          </p:cNvPr>
+          <p:cNvSpPr>
+            <a:spLocks noGrp="1"/>
+          </p:cNvSpPr>
+          <p:nvPr>
+            <p:ph type="title"/>
+          </p:nvPr>
+        </p:nvSpPr>
+        <p:spPr/>
+        <p:txBody>
+          <a:bodyPr/>
+          <a:lstStyle/>
+          <a:p>
+            <a:r>
+              <a:rPr lang="zh-CN" altLang="en-US" dirty="0"/>
+              <a:t>启用</a:t>
+            </a:r>
+            <a:r>
+              <a:rPr lang="en-US" altLang="zh-CN" dirty="0" err="1"/>
+              <a:t>ssh</a:t>
+            </a:r>
+            <a:r>
+              <a:rPr lang="zh-CN" altLang="en-US" dirty="0"/>
+              <a:t>，</a:t>
+            </a:r>
+            <a:r>
+              <a:rPr lang="en-US" altLang="zh-CN" dirty="0" err="1"/>
+              <a:t>vscode</a:t>
+            </a:r>
+            <a:r>
+              <a:rPr lang="zh-CN" altLang="en-US" dirty="0"/>
+              <a:t>远程访问虚拟机</a:t>
+            </a:r>
+          </a:p>
+        </p:txBody>
+      </p:sp>
+      <p:sp>
+        <p:nvSpPr>
+          <p:cNvPr id="3" name="内容占位符 2">
+            <a:extLst>
+              <a:ext uri="{FF2B5EF4-FFF2-40B4-BE49-F238E27FC236}">
+                <a16:creationId xmlns:a16="http://schemas.microsoft.com/office/drawing/2014/main" id="{1A3B849F-1ED0-448A-BC19-99595E165234}"/>
+              </a:ext>
+            </a:extLst>
+          </p:cNvPr>
+          <p:cNvSpPr>
+            <a:spLocks noGrp="1"/>
+          </p:cNvSpPr>
+          <p:nvPr>
+            <p:ph idx="1"/>
+          </p:nvPr>
+        </p:nvSpPr>
+        <p:spPr/>
+        <p:txBody>
+          <a:bodyPr/>
+          <a:lstStyle/>
+          <a:p>
+            <a:endParaRPr lang="zh-CN" altLang="en-US"/>
+          </a:p>
+        </p:txBody>
+      </p:sp>
+      <p:sp>
+        <p:nvSpPr>
+          <p:cNvPr id="4" name="灯片编号占位符 3">
+            <a:extLst>
+              <a:ext uri="{FF2B5EF4-FFF2-40B4-BE49-F238E27FC236}">
+                <a16:creationId xmlns:a16="http://schemas.microsoft.com/office/drawing/2014/main" id="{BA988414-413A-4607-8D85-3665C0E2DE94}"/>
+              </a:ext>
+            </a:extLst>
+          </p:cNvPr>
+          <p:cNvSpPr>
+            <a:spLocks noGrp="1"/>
+          </p:cNvSpPr>
+          <p:nvPr>
+            <p:ph type="sldNum" sz="quarter" idx="11"/>
+          </p:nvPr>
+        </p:nvSpPr>
+        <p:spPr/>
+        <p:txBody>
+          <a:bodyPr/>
+          <a:lstStyle/>
+          <a:p>
+            <a:fld id="{0C913308-F349-4B6D-A68A-DD1791B4A57B}" type="slidenum">
+              <a:rPr lang="zh-CN" altLang="en-US" smtClean="0"/>
+              <a:t>12</a:t>
+            </a:fld>
+            <a:endParaRPr lang="zh-CN" altLang="en-US"/>
+          </a:p>
+        </p:txBody>
+      </p:sp>
+    </p:spTree>
+    <p:extLst>
+      <p:ext uri="{BB962C8B-B14F-4D97-AF65-F5344CB8AC3E}">
+        <p14:creationId xmlns:p14="http://schemas.microsoft.com/office/powerpoint/2010/main" val="1007175799"/>
+      </p:ext>
+    </p:extLst>
+  </p:cSld>
+  <p:clrMapOvr>
+    <a:masterClrMapping/>
+  </p:clrMapOvr>
+  <p:transition/>
 </p:sld>
 </file>
 
@@ -10313,6 +10816,628 @@
     <p:extLst>
       <p:ext uri="{BB962C8B-B14F-4D97-AF65-F5344CB8AC3E}">
         <p14:creationId xmlns:p14="http://schemas.microsoft.com/office/powerpoint/2010/main" val="2462004088"/>
+      </p:ext>
+    </p:extLst>
+  </p:cSld>
+  <p:clrMapOvr>
+    <a:masterClrMapping/>
+  </p:clrMapOvr>
+  <p:transition/>
+</p:sld>
+</file>
+
+<file path=ppt/slides/slide8.xml><?xml version="1.0" encoding="utf-8"?>
+<p:sld xmlns:a="http://schemas.openxmlformats.org/drawingml/2006/main" xmlns:r="http://schemas.openxmlformats.org/officeDocument/2006/relationships" xmlns:p="http://schemas.openxmlformats.org/presentationml/2006/main">
+  <p:cSld>
+    <p:spTree>
+      <p:nvGrpSpPr>
+        <p:cNvPr id="1" name=""/>
+        <p:cNvGrpSpPr/>
+        <p:nvPr/>
+      </p:nvGrpSpPr>
+      <p:grpSpPr>
+        <a:xfrm>
+          <a:off x="0" y="0"/>
+          <a:ext cx="0" cy="0"/>
+          <a:chOff x="0" y="0"/>
+          <a:chExt cx="0" cy="0"/>
+        </a:xfrm>
+      </p:grpSpPr>
+      <p:sp>
+        <p:nvSpPr>
+          <p:cNvPr id="2" name="标题 1">
+            <a:extLst>
+              <a:ext uri="{FF2B5EF4-FFF2-40B4-BE49-F238E27FC236}">
+                <a16:creationId xmlns:a16="http://schemas.microsoft.com/office/drawing/2014/main" id="{63A53246-33BA-408E-8B46-10FF7C8A3B9F}"/>
+              </a:ext>
+            </a:extLst>
+          </p:cNvPr>
+          <p:cNvSpPr>
+            <a:spLocks noGrp="1"/>
+          </p:cNvSpPr>
+          <p:nvPr>
+            <p:ph type="title"/>
+          </p:nvPr>
+        </p:nvSpPr>
+        <p:spPr/>
+        <p:txBody>
+          <a:bodyPr/>
+          <a:lstStyle/>
+          <a:p>
+            <a:r>
+              <a:rPr lang="zh-CN" altLang="en-US" dirty="0"/>
+              <a:t>设置</a:t>
+            </a:r>
+            <a:r>
+              <a:rPr lang="en-US" altLang="zh-CN" dirty="0"/>
+              <a:t>visual studio extension</a:t>
+            </a:r>
+            <a:endParaRPr lang="zh-CN" altLang="en-US" dirty="0"/>
+          </a:p>
+        </p:txBody>
+      </p:sp>
+      <p:sp>
+        <p:nvSpPr>
+          <p:cNvPr id="3" name="内容占位符 2">
+            <a:extLst>
+              <a:ext uri="{FF2B5EF4-FFF2-40B4-BE49-F238E27FC236}">
+                <a16:creationId xmlns:a16="http://schemas.microsoft.com/office/drawing/2014/main" id="{B45E3DF4-6AEA-4205-8092-4D96FCF15CA2}"/>
+              </a:ext>
+            </a:extLst>
+          </p:cNvPr>
+          <p:cNvSpPr>
+            <a:spLocks noGrp="1"/>
+          </p:cNvSpPr>
+          <p:nvPr>
+            <p:ph idx="1"/>
+          </p:nvPr>
+        </p:nvSpPr>
+        <p:spPr/>
+        <p:txBody>
+          <a:bodyPr/>
+          <a:lstStyle/>
+          <a:p>
+            <a:r>
+              <a:rPr lang="en-US" altLang="zh-CN" dirty="0"/>
+              <a:t>ubuntu</a:t>
+            </a:r>
+            <a:r>
+              <a:rPr lang="zh-CN" altLang="en-US" dirty="0"/>
+              <a:t>虚拟机中的</a:t>
+            </a:r>
+            <a:r>
+              <a:rPr lang="en-US" altLang="zh-CN" dirty="0" err="1"/>
+              <a:t>vscode</a:t>
+            </a:r>
+            <a:r>
+              <a:rPr lang="en-US" altLang="zh-CN" dirty="0"/>
+              <a:t>:</a:t>
+            </a:r>
+            <a:r>
+              <a:rPr lang="zh-CN" altLang="en-US" dirty="0"/>
+              <a:t>扩展失败</a:t>
+            </a:r>
+            <a:endParaRPr lang="en-US" altLang="zh-CN" dirty="0"/>
+          </a:p>
+          <a:p>
+            <a:pPr lvl="1"/>
+            <a:r>
+              <a:rPr lang="en-US" altLang="zh-CN" dirty="0">
+                <a:hlinkClick r:id="rId2"/>
+              </a:rPr>
+              <a:t>https://blog.csdn.net/weixin_45758781/article/details/126896345#:~:text=%E6%9C%AC%E6%96%87%E4%BB%8B%E7%BB%8D%E4%BA%86%E5%9C%A8</a:t>
+            </a:r>
+            <a:r>
+              <a:rPr lang="en-US" altLang="zh-CN" dirty="0"/>
+              <a:t> </a:t>
+            </a:r>
+          </a:p>
+          <a:p>
+            <a:pPr lvl="1"/>
+            <a:endParaRPr lang="en-US" altLang="zh-CN" dirty="0"/>
+          </a:p>
+          <a:p>
+            <a:pPr lvl="1"/>
+            <a:r>
+              <a:rPr lang="en-US" altLang="zh-CN" dirty="0"/>
+              <a:t>1.</a:t>
+            </a:r>
+            <a:r>
+              <a:rPr lang="zh-CN" altLang="en-US" dirty="0"/>
+              <a:t>在</a:t>
+            </a:r>
+            <a:r>
+              <a:rPr lang="en-US" altLang="zh-CN" dirty="0"/>
+              <a:t>Ubuntu</a:t>
+            </a:r>
+            <a:r>
+              <a:rPr lang="zh-CN" altLang="en-US" dirty="0"/>
+              <a:t>的终端中打开</a:t>
+            </a:r>
+            <a:r>
+              <a:rPr lang="en-US" altLang="zh-CN" dirty="0"/>
+              <a:t>hosts</a:t>
+            </a:r>
+            <a:r>
+              <a:rPr lang="zh-CN" altLang="en-US" dirty="0"/>
+              <a:t>文件</a:t>
+            </a:r>
+          </a:p>
+          <a:p>
+            <a:pPr lvl="2"/>
+            <a:r>
+              <a:rPr lang="en-US" altLang="zh-CN" dirty="0" err="1"/>
+              <a:t>sudo</a:t>
+            </a:r>
+            <a:r>
+              <a:rPr lang="en-US" altLang="zh-CN" dirty="0"/>
+              <a:t> </a:t>
+            </a:r>
+            <a:r>
+              <a:rPr lang="en-US" altLang="zh-CN" dirty="0" err="1"/>
+              <a:t>gedit</a:t>
+            </a:r>
+            <a:r>
+              <a:rPr lang="en-US" altLang="zh-CN" dirty="0"/>
+              <a:t> /</a:t>
+            </a:r>
+            <a:r>
+              <a:rPr lang="en-US" altLang="zh-CN" dirty="0" err="1"/>
+              <a:t>etc</a:t>
+            </a:r>
+            <a:r>
+              <a:rPr lang="en-US" altLang="zh-CN" dirty="0"/>
+              <a:t>/hosts</a:t>
+            </a:r>
+          </a:p>
+          <a:p>
+            <a:pPr lvl="1"/>
+            <a:r>
+              <a:rPr lang="en-US" altLang="zh-CN" dirty="0"/>
+              <a:t>2.</a:t>
+            </a:r>
+            <a:r>
+              <a:rPr lang="zh-CN" altLang="en-US" dirty="0"/>
+              <a:t>在文件中新增</a:t>
+            </a:r>
+            <a:r>
+              <a:rPr lang="en-US" altLang="zh-CN" dirty="0"/>
+              <a:t>IP</a:t>
+            </a:r>
+            <a:r>
+              <a:rPr lang="zh-CN" altLang="en-US" dirty="0"/>
+              <a:t>与域名的对应关系如下</a:t>
+            </a:r>
+            <a:r>
+              <a:rPr lang="en-US" altLang="zh-CN" dirty="0"/>
+              <a:t>,</a:t>
+            </a:r>
+            <a:r>
+              <a:rPr lang="zh-CN" altLang="en-US" dirty="0"/>
+              <a:t>并保存</a:t>
+            </a:r>
+            <a:r>
+              <a:rPr lang="en-US" altLang="zh-CN" dirty="0"/>
+              <a:t>hosts</a:t>
+            </a:r>
+            <a:r>
+              <a:rPr lang="zh-CN" altLang="en-US" dirty="0"/>
+              <a:t>文件：</a:t>
+            </a:r>
+          </a:p>
+          <a:p>
+            <a:pPr lvl="2"/>
+            <a:r>
+              <a:rPr lang="en-US" altLang="zh-CN" b="1" dirty="0"/>
+              <a:t>13.107.42.18 marketplace.visualstudio.com</a:t>
+            </a:r>
+          </a:p>
+          <a:p>
+            <a:pPr lvl="1"/>
+            <a:r>
+              <a:rPr lang="en-US" altLang="zh-CN" dirty="0"/>
+              <a:t>3.</a:t>
+            </a:r>
+            <a:r>
+              <a:rPr lang="zh-CN" altLang="en-US" dirty="0"/>
+              <a:t>重启</a:t>
+            </a:r>
+            <a:r>
+              <a:rPr lang="en-US" altLang="zh-CN" dirty="0"/>
+              <a:t>Ubuntu</a:t>
+            </a:r>
+          </a:p>
+          <a:p>
+            <a:pPr lvl="1"/>
+            <a:endParaRPr lang="en-US" altLang="zh-CN" dirty="0"/>
+          </a:p>
+          <a:p>
+            <a:r>
+              <a:rPr lang="zh-CN" altLang="en-US" dirty="0"/>
+              <a:t>安装</a:t>
+            </a:r>
+            <a:r>
+              <a:rPr lang="en-US" altLang="zh-CN" dirty="0" err="1"/>
+              <a:t>verilog</a:t>
+            </a:r>
+            <a:r>
+              <a:rPr lang="zh-CN" altLang="en-US" dirty="0"/>
+              <a:t>、</a:t>
+            </a:r>
+            <a:r>
+              <a:rPr lang="en-US" altLang="zh-CN" dirty="0"/>
+              <a:t>python</a:t>
+            </a:r>
+            <a:r>
+              <a:rPr lang="zh-CN" altLang="en-US" dirty="0"/>
+              <a:t>扩展等</a:t>
+            </a:r>
+            <a:endParaRPr lang="en-US" altLang="zh-CN" dirty="0"/>
+          </a:p>
+          <a:p>
+            <a:pPr lvl="1"/>
+            <a:endParaRPr lang="zh-CN" altLang="en-US" dirty="0"/>
+          </a:p>
+        </p:txBody>
+      </p:sp>
+      <p:sp>
+        <p:nvSpPr>
+          <p:cNvPr id="5" name="灯片编号占位符 4">
+            <a:extLst>
+              <a:ext uri="{FF2B5EF4-FFF2-40B4-BE49-F238E27FC236}">
+                <a16:creationId xmlns:a16="http://schemas.microsoft.com/office/drawing/2014/main" id="{5AAA031B-B638-4854-8FD8-D896A166F3CE}"/>
+              </a:ext>
+            </a:extLst>
+          </p:cNvPr>
+          <p:cNvSpPr>
+            <a:spLocks noGrp="1"/>
+          </p:cNvSpPr>
+          <p:nvPr>
+            <p:ph type="sldNum" sz="quarter" idx="11"/>
+          </p:nvPr>
+        </p:nvSpPr>
+        <p:spPr/>
+        <p:txBody>
+          <a:bodyPr/>
+          <a:lstStyle/>
+          <a:p>
+            <a:fld id="{0C913308-F349-4B6D-A68A-DD1791B4A57B}" type="slidenum">
+              <a:rPr lang="zh-CN" altLang="en-US" smtClean="0"/>
+              <a:t>8</a:t>
+            </a:fld>
+            <a:endParaRPr lang="zh-CN" altLang="en-US"/>
+          </a:p>
+        </p:txBody>
+      </p:sp>
+      <p:pic>
+        <p:nvPicPr>
+          <p:cNvPr id="8" name="图片 7">
+            <a:extLst>
+              <a:ext uri="{FF2B5EF4-FFF2-40B4-BE49-F238E27FC236}">
+                <a16:creationId xmlns:a16="http://schemas.microsoft.com/office/drawing/2014/main" id="{B9C4ACA6-80C2-4AF9-92AF-F53FF1CFDEC1}"/>
+              </a:ext>
+            </a:extLst>
+          </p:cNvPr>
+          <p:cNvPicPr>
+            <a:picLocks noChangeAspect="1"/>
+          </p:cNvPicPr>
+          <p:nvPr/>
+        </p:nvPicPr>
+        <p:blipFill>
+          <a:blip r:embed="rId3"/>
+          <a:stretch>
+            <a:fillRect/>
+          </a:stretch>
+        </p:blipFill>
+        <p:spPr>
+          <a:xfrm>
+            <a:off x="428759" y="4609813"/>
+            <a:ext cx="2588481" cy="1728192"/>
+          </a:xfrm>
+          <a:prstGeom prst="rect">
+            <a:avLst/>
+          </a:prstGeom>
+        </p:spPr>
+      </p:pic>
+      <p:pic>
+        <p:nvPicPr>
+          <p:cNvPr id="9" name="图片 8">
+            <a:extLst>
+              <a:ext uri="{FF2B5EF4-FFF2-40B4-BE49-F238E27FC236}">
+                <a16:creationId xmlns:a16="http://schemas.microsoft.com/office/drawing/2014/main" id="{C759AFA8-584E-40A4-BF8F-94ABAFB4C7CA}"/>
+              </a:ext>
+            </a:extLst>
+          </p:cNvPr>
+          <p:cNvPicPr>
+            <a:picLocks noChangeAspect="1"/>
+          </p:cNvPicPr>
+          <p:nvPr/>
+        </p:nvPicPr>
+        <p:blipFill>
+          <a:blip r:embed="rId4"/>
+          <a:stretch>
+            <a:fillRect/>
+          </a:stretch>
+        </p:blipFill>
+        <p:spPr>
+          <a:xfrm>
+            <a:off x="3203848" y="4589459"/>
+            <a:ext cx="1800200" cy="1718011"/>
+          </a:xfrm>
+          <a:prstGeom prst="rect">
+            <a:avLst/>
+          </a:prstGeom>
+        </p:spPr>
+      </p:pic>
+    </p:spTree>
+    <p:extLst>
+      <p:ext uri="{BB962C8B-B14F-4D97-AF65-F5344CB8AC3E}">
+        <p14:creationId xmlns:p14="http://schemas.microsoft.com/office/powerpoint/2010/main" val="370769049"/>
+      </p:ext>
+    </p:extLst>
+  </p:cSld>
+  <p:clrMapOvr>
+    <a:masterClrMapping/>
+  </p:clrMapOvr>
+  <p:transition/>
+</p:sld>
+</file>
+
+<file path=ppt/slides/slide9.xml><?xml version="1.0" encoding="utf-8"?>
+<p:sld xmlns:a="http://schemas.openxmlformats.org/drawingml/2006/main" xmlns:r="http://schemas.openxmlformats.org/officeDocument/2006/relationships" xmlns:p="http://schemas.openxmlformats.org/presentationml/2006/main">
+  <p:cSld>
+    <p:spTree>
+      <p:nvGrpSpPr>
+        <p:cNvPr id="1" name=""/>
+        <p:cNvGrpSpPr/>
+        <p:nvPr/>
+      </p:nvGrpSpPr>
+      <p:grpSpPr>
+        <a:xfrm>
+          <a:off x="0" y="0"/>
+          <a:ext cx="0" cy="0"/>
+          <a:chOff x="0" y="0"/>
+          <a:chExt cx="0" cy="0"/>
+        </a:xfrm>
+      </p:grpSpPr>
+      <p:sp>
+        <p:nvSpPr>
+          <p:cNvPr id="2" name="标题 1">
+            <a:extLst>
+              <a:ext uri="{FF2B5EF4-FFF2-40B4-BE49-F238E27FC236}">
+                <a16:creationId xmlns:a16="http://schemas.microsoft.com/office/drawing/2014/main" id="{9918846C-16CD-4B57-8C59-9A139699549A}"/>
+              </a:ext>
+            </a:extLst>
+          </p:cNvPr>
+          <p:cNvSpPr>
+            <a:spLocks noGrp="1"/>
+          </p:cNvSpPr>
+          <p:nvPr>
+            <p:ph type="title"/>
+          </p:nvPr>
+        </p:nvSpPr>
+        <p:spPr/>
+        <p:txBody>
+          <a:bodyPr/>
+          <a:lstStyle/>
+          <a:p>
+            <a:r>
+              <a:rPr lang="zh-CN" altLang="en-US" dirty="0"/>
+              <a:t>设置</a:t>
+            </a:r>
+            <a:r>
+              <a:rPr lang="en-US" altLang="zh-CN" dirty="0" err="1"/>
+              <a:t>github</a:t>
+            </a:r>
+            <a:r>
+              <a:rPr lang="zh-CN" altLang="en-US" dirty="0"/>
+              <a:t>代理</a:t>
+            </a:r>
+          </a:p>
+        </p:txBody>
+      </p:sp>
+      <p:sp>
+        <p:nvSpPr>
+          <p:cNvPr id="3" name="内容占位符 2">
+            <a:extLst>
+              <a:ext uri="{FF2B5EF4-FFF2-40B4-BE49-F238E27FC236}">
+                <a16:creationId xmlns:a16="http://schemas.microsoft.com/office/drawing/2014/main" id="{78FFD142-737E-4914-9532-7A9CCE39B009}"/>
+              </a:ext>
+            </a:extLst>
+          </p:cNvPr>
+          <p:cNvSpPr>
+            <a:spLocks noGrp="1"/>
+          </p:cNvSpPr>
+          <p:nvPr>
+            <p:ph idx="1"/>
+          </p:nvPr>
+        </p:nvSpPr>
+        <p:spPr/>
+        <p:txBody>
+          <a:bodyPr/>
+          <a:lstStyle/>
+          <a:p>
+            <a:endParaRPr lang="en-US" altLang="zh-CN" dirty="0"/>
+          </a:p>
+          <a:p>
+            <a:pPr lvl="1"/>
+            <a:r>
+              <a:rPr lang="en-US" altLang="zh-CN" dirty="0"/>
+              <a:t>1.</a:t>
+            </a:r>
+            <a:r>
+              <a:rPr lang="zh-CN" altLang="en-US" dirty="0"/>
+              <a:t>在</a:t>
+            </a:r>
+            <a:r>
+              <a:rPr lang="en-US" altLang="zh-CN" dirty="0"/>
+              <a:t>Ubuntu</a:t>
+            </a:r>
+            <a:r>
+              <a:rPr lang="zh-CN" altLang="en-US" dirty="0"/>
+              <a:t>的终端中打开</a:t>
+            </a:r>
+            <a:r>
+              <a:rPr lang="en-US" altLang="zh-CN" dirty="0"/>
+              <a:t>hosts</a:t>
+            </a:r>
+            <a:r>
+              <a:rPr lang="zh-CN" altLang="en-US" dirty="0"/>
+              <a:t>文件</a:t>
+            </a:r>
+          </a:p>
+          <a:p>
+            <a:pPr lvl="2"/>
+            <a:r>
+              <a:rPr lang="en-US" altLang="zh-CN" dirty="0" err="1"/>
+              <a:t>sudo</a:t>
+            </a:r>
+            <a:r>
+              <a:rPr lang="en-US" altLang="zh-CN" dirty="0"/>
+              <a:t> </a:t>
+            </a:r>
+            <a:r>
+              <a:rPr lang="en-US" altLang="zh-CN" dirty="0" err="1"/>
+              <a:t>gedit</a:t>
+            </a:r>
+            <a:r>
+              <a:rPr lang="en-US" altLang="zh-CN" dirty="0"/>
+              <a:t> /</a:t>
+            </a:r>
+            <a:r>
+              <a:rPr lang="en-US" altLang="zh-CN" dirty="0" err="1"/>
+              <a:t>etc</a:t>
+            </a:r>
+            <a:r>
+              <a:rPr lang="en-US" altLang="zh-CN" dirty="0"/>
+              <a:t>/hosts</a:t>
+            </a:r>
+          </a:p>
+          <a:p>
+            <a:pPr lvl="1"/>
+            <a:r>
+              <a:rPr lang="en-US" altLang="zh-CN" dirty="0"/>
+              <a:t>2.</a:t>
+            </a:r>
+            <a:r>
+              <a:rPr lang="zh-CN" altLang="en-US" dirty="0"/>
+              <a:t>在文件中新增</a:t>
+            </a:r>
+            <a:r>
+              <a:rPr lang="en-US" altLang="zh-CN" dirty="0"/>
+              <a:t>IP</a:t>
+            </a:r>
+            <a:r>
+              <a:rPr lang="zh-CN" altLang="en-US" dirty="0"/>
+              <a:t>与域名的对应关系如下</a:t>
+            </a:r>
+            <a:r>
+              <a:rPr lang="en-US" altLang="zh-CN" dirty="0"/>
+              <a:t>,</a:t>
+            </a:r>
+            <a:r>
+              <a:rPr lang="zh-CN" altLang="en-US" dirty="0"/>
+              <a:t>并保存</a:t>
+            </a:r>
+            <a:r>
+              <a:rPr lang="en-US" altLang="zh-CN" dirty="0"/>
+              <a:t>hosts</a:t>
+            </a:r>
+            <a:r>
+              <a:rPr lang="zh-CN" altLang="en-US" dirty="0"/>
+              <a:t>文件：</a:t>
+            </a:r>
+          </a:p>
+          <a:p>
+            <a:pPr lvl="2"/>
+            <a:r>
+              <a:rPr lang="en-US" altLang="zh-CN" b="1" dirty="0"/>
+              <a:t>140.82.114.3 github.com</a:t>
+            </a:r>
+          </a:p>
+          <a:p>
+            <a:pPr lvl="1"/>
+            <a:r>
+              <a:rPr lang="en-US" altLang="zh-CN" dirty="0"/>
+              <a:t>3.</a:t>
+            </a:r>
+            <a:r>
+              <a:rPr lang="zh-CN" altLang="en-US" dirty="0"/>
+              <a:t>重启</a:t>
+            </a:r>
+            <a:r>
+              <a:rPr lang="en-US" altLang="zh-CN" dirty="0"/>
+              <a:t>Ubuntu</a:t>
+            </a:r>
+            <a:r>
+              <a:rPr lang="zh-CN" altLang="en-US" dirty="0"/>
+              <a:t>，可以打开</a:t>
+            </a:r>
+            <a:r>
+              <a:rPr lang="en-US" altLang="zh-CN" dirty="0" err="1"/>
+              <a:t>github</a:t>
+            </a:r>
+            <a:r>
+              <a:rPr lang="zh-CN" altLang="en-US" dirty="0"/>
+              <a:t>网站，并用</a:t>
+            </a:r>
+            <a:r>
+              <a:rPr lang="en-US" altLang="zh-CN" dirty="0"/>
+              <a:t>git</a:t>
+            </a:r>
+            <a:r>
+              <a:rPr lang="zh-CN" altLang="en-US" dirty="0"/>
+              <a:t>命令</a:t>
+            </a:r>
+            <a:r>
+              <a:rPr lang="en-US" altLang="zh-CN" dirty="0"/>
+              <a:t>clone/pull</a:t>
+            </a:r>
+            <a:r>
+              <a:rPr lang="zh-CN" altLang="en-US" dirty="0"/>
+              <a:t>代码</a:t>
+            </a:r>
+            <a:endParaRPr lang="en-US" altLang="zh-CN" dirty="0"/>
+          </a:p>
+          <a:p>
+            <a:pPr lvl="1"/>
+            <a:endParaRPr lang="zh-CN" altLang="en-US" dirty="0"/>
+          </a:p>
+        </p:txBody>
+      </p:sp>
+      <p:sp>
+        <p:nvSpPr>
+          <p:cNvPr id="4" name="灯片编号占位符 3">
+            <a:extLst>
+              <a:ext uri="{FF2B5EF4-FFF2-40B4-BE49-F238E27FC236}">
+                <a16:creationId xmlns:a16="http://schemas.microsoft.com/office/drawing/2014/main" id="{9C330CA4-00E4-4A2F-9659-6A931FDFEA08}"/>
+              </a:ext>
+            </a:extLst>
+          </p:cNvPr>
+          <p:cNvSpPr>
+            <a:spLocks noGrp="1"/>
+          </p:cNvSpPr>
+          <p:nvPr>
+            <p:ph type="sldNum" sz="quarter" idx="11"/>
+          </p:nvPr>
+        </p:nvSpPr>
+        <p:spPr/>
+        <p:txBody>
+          <a:bodyPr/>
+          <a:lstStyle/>
+          <a:p>
+            <a:fld id="{0C913308-F349-4B6D-A68A-DD1791B4A57B}" type="slidenum">
+              <a:rPr lang="zh-CN" altLang="en-US" smtClean="0"/>
+              <a:t>9</a:t>
+            </a:fld>
+            <a:endParaRPr lang="zh-CN" altLang="en-US"/>
+          </a:p>
+        </p:txBody>
+      </p:sp>
+    </p:spTree>
+    <p:extLst>
+      <p:ext uri="{BB962C8B-B14F-4D97-AF65-F5344CB8AC3E}">
+        <p14:creationId xmlns:p14="http://schemas.microsoft.com/office/powerpoint/2010/main" val="3926728663"/>
       </p:ext>
     </p:extLst>
   </p:cSld>

</xml_diff>